<commit_message>
add link to github
</commit_message>
<xml_diff>
--- a/Revision course.pptx
+++ b/Revision course.pptx
@@ -187,7 +187,7 @@
 <file path=ppt/revisionInfo.xml><?xml version="1.0" encoding="utf-8"?>
 <p1510:revInfo xmlns:a="http://schemas.openxmlformats.org/drawingml/2006/main" xmlns:r="http://schemas.openxmlformats.org/officeDocument/2006/relationships" xmlns:p1510="http://schemas.microsoft.com/office/powerpoint/2015/10/main">
   <p1510:revLst>
-    <p1510:client id="{96B736BA-B759-48F8-8B3F-CDD2D5C9814A}" v="33" dt="2020-03-04T15:21:49.789"/>
+    <p1510:client id="{96B736BA-B759-48F8-8B3F-CDD2D5C9814A}" v="36" dt="2020-03-08T21:28:34.710"/>
   </p1510:revLst>
 </p1510:revInfo>
 </file>
@@ -197,7 +197,7 @@
   <pc:docChgLst>
     <pc:chgData name="Jonas Hübotter" userId="30c0ea434229f4a4" providerId="LiveId" clId="{96B736BA-B759-48F8-8B3F-CDD2D5C9814A}"/>
     <pc:docChg chg="undo custSel addSld delSld modSld sldOrd">
-      <pc:chgData name="Jonas Hübotter" userId="30c0ea434229f4a4" providerId="LiveId" clId="{96B736BA-B759-48F8-8B3F-CDD2D5C9814A}" dt="2020-03-04T15:22:10.333" v="1888" actId="2696"/>
+      <pc:chgData name="Jonas Hübotter" userId="30c0ea434229f4a4" providerId="LiveId" clId="{96B736BA-B759-48F8-8B3F-CDD2D5C9814A}" dt="2020-03-08T21:28:54.615" v="2029" actId="2696"/>
       <pc:docMkLst>
         <pc:docMk/>
       </pc:docMkLst>
@@ -480,7 +480,7 @@
         </pc:spChg>
       </pc:sldChg>
       <pc:sldChg chg="modSp add">
-        <pc:chgData name="Jonas Hübotter" userId="30c0ea434229f4a4" providerId="LiveId" clId="{96B736BA-B759-48F8-8B3F-CDD2D5C9814A}" dt="2020-03-04T15:15:28.081" v="1738" actId="20577"/>
+        <pc:chgData name="Jonas Hübotter" userId="30c0ea434229f4a4" providerId="LiveId" clId="{96B736BA-B759-48F8-8B3F-CDD2D5C9814A}" dt="2020-03-08T21:28:38.366" v="2028" actId="20577"/>
         <pc:sldMkLst>
           <pc:docMk/>
           <pc:sldMk cId="929171279" sldId="401"/>
@@ -494,7 +494,7 @@
           </ac:spMkLst>
         </pc:spChg>
         <pc:spChg chg="mod">
-          <ac:chgData name="Jonas Hübotter" userId="30c0ea434229f4a4" providerId="LiveId" clId="{96B736BA-B759-48F8-8B3F-CDD2D5C9814A}" dt="2020-03-04T15:15:28.081" v="1738" actId="20577"/>
+          <ac:chgData name="Jonas Hübotter" userId="30c0ea434229f4a4" providerId="LiveId" clId="{96B736BA-B759-48F8-8B3F-CDD2D5C9814A}" dt="2020-03-08T21:28:38.366" v="2028" actId="20577"/>
           <ac:spMkLst>
             <pc:docMk/>
             <pc:sldMk cId="929171279" sldId="401"/>
@@ -532,6 +532,29 @@
           </ac:spMkLst>
         </pc:spChg>
       </pc:sldChg>
+      <pc:sldChg chg="modSp add del">
+        <pc:chgData name="Jonas Hübotter" userId="30c0ea434229f4a4" providerId="LiveId" clId="{96B736BA-B759-48F8-8B3F-CDD2D5C9814A}" dt="2020-03-08T21:28:54.615" v="2029" actId="2696"/>
+        <pc:sldMkLst>
+          <pc:docMk/>
+          <pc:sldMk cId="1222540987" sldId="403"/>
+        </pc:sldMkLst>
+        <pc:spChg chg="mod">
+          <ac:chgData name="Jonas Hübotter" userId="30c0ea434229f4a4" providerId="LiveId" clId="{96B736BA-B759-48F8-8B3F-CDD2D5C9814A}" dt="2020-03-08T21:24:10.442" v="1898" actId="20577"/>
+          <ac:spMkLst>
+            <pc:docMk/>
+            <pc:sldMk cId="1222540987" sldId="403"/>
+            <ac:spMk id="3" creationId="{00000000-0000-0000-0000-000000000000}"/>
+          </ac:spMkLst>
+        </pc:spChg>
+        <pc:spChg chg="mod">
+          <ac:chgData name="Jonas Hübotter" userId="30c0ea434229f4a4" providerId="LiveId" clId="{96B736BA-B759-48F8-8B3F-CDD2D5C9814A}" dt="2020-03-08T21:28:28.542" v="2021"/>
+          <ac:spMkLst>
+            <pc:docMk/>
+            <pc:sldMk cId="1222540987" sldId="403"/>
+            <ac:spMk id="6" creationId="{CC81D14F-5935-4644-8DF7-6440E6E81677}"/>
+          </ac:spMkLst>
+        </pc:spChg>
+      </pc:sldChg>
     </pc:docChg>
   </pc:docChgLst>
 </pc:chgInfo>
@@ -646,7 +669,7 @@
               <a:pPr>
                 <a:defRPr/>
               </a:pPr>
-              <a:t>04/03/2020</a:t>
+              <a:t>08/03/2020</a:t>
             </a:fld>
             <a:endParaRPr lang="en-GB" dirty="0"/>
           </a:p>
@@ -865,7 +888,7 @@
               <a:pPr>
                 <a:defRPr/>
               </a:pPr>
-              <a:t>04/03/2020</a:t>
+              <a:t>08/03/2020</a:t>
             </a:fld>
             <a:endParaRPr lang="en-GB"/>
           </a:p>
@@ -11226,6 +11249,27 @@
               <a:t>let me know when you want to spend more time on a topic</a:t>
             </a:r>
           </a:p>
+          <a:p>
+            <a:endParaRPr lang="en-US" dirty="0"/>
+          </a:p>
+          <a:p>
+            <a:endParaRPr lang="en-US" dirty="0"/>
+          </a:p>
+          <a:p>
+            <a:r>
+              <a:rPr lang="en-US" dirty="0"/>
+              <a:t>Slides, problems, and solutions can be found on GitHub:</a:t>
+            </a:r>
+          </a:p>
+          <a:p>
+            <a:r>
+              <a:rPr lang="en-US" dirty="0">
+                <a:hlinkClick r:id="rId2"/>
+              </a:rPr>
+              <a:t>https://github.com/jonhue/teaching-fpv-rev</a:t>
+            </a:r>
+            <a:endParaRPr lang="en-US" dirty="0"/>
+          </a:p>
         </p:txBody>
       </p:sp>
     </p:spTree>

</xml_diff>